<commit_message>
Added Lab and Datasheets to Workshop 202.1
</commit_message>
<xml_diff>
--- a/200 - Digital Electronics Fundamentals/202.1/Digital Electronics Fundamentals 202.1.pptx
+++ b/200 - Digital Electronics Fundamentals/202.1/Digital Electronics Fundamentals 202.1.pptx
@@ -14,6 +14,7 @@
     <p:sldId id="262" r:id="rId8"/>
     <p:sldId id="263" r:id="rId9"/>
     <p:sldId id="264" r:id="rId10"/>
+    <p:sldId id="265" r:id="rId11"/>
   </p:sldIdLst>
   <p:sldSz cx="9144000" cy="6858000" type="screen4x3"/>
   <p:notesSz cx="6858000" cy="9144000"/>
@@ -3096,18 +3097,7 @@
                   </a:schemeClr>
                 </a:solidFill>
               </a:rPr>
-              <a:t>Digital Electronics Fundamentals </a:t>
-            </a:r>
-            <a:r>
-              <a:rPr lang="en-CA" dirty="0" smtClean="0">
-                <a:solidFill>
-                  <a:schemeClr val="tx1">
-                    <a:lumMod val="95000"/>
-                    <a:lumOff val="5000"/>
-                  </a:schemeClr>
-                </a:solidFill>
-              </a:rPr>
-              <a:t>202.1</a:t>
+              <a:t>Digital Electronics Fundamentals 202.1</a:t>
             </a:r>
             <a:endParaRPr lang="en-CA" dirty="0">
               <a:solidFill>
@@ -3138,7 +3128,7 @@
         </p:spPr>
         <p:txBody>
           <a:bodyPr>
-            <a:normAutofit fontScale="92500" lnSpcReduction="20000"/>
+            <a:normAutofit fontScale="77500" lnSpcReduction="20000"/>
           </a:bodyPr>
           <a:lstStyle/>
           <a:p>
@@ -3152,27 +3142,8 @@
                   </a:schemeClr>
                 </a:solidFill>
               </a:rPr>
-              <a:t>-Binary </a:t>
-            </a:r>
-            <a:r>
-              <a:rPr lang="en-CA" dirty="0" smtClean="0">
-                <a:solidFill>
-                  <a:schemeClr val="tx1">
-                    <a:lumMod val="75000"/>
-                    <a:lumOff val="25000"/>
-                  </a:schemeClr>
-                </a:solidFill>
-              </a:rPr>
-              <a:t>Numeral System</a:t>
-            </a:r>
-            <a:endParaRPr lang="en-CA" dirty="0" smtClean="0">
-              <a:solidFill>
-                <a:schemeClr val="tx1">
-                  <a:lumMod val="75000"/>
-                  <a:lumOff val="25000"/>
-                </a:schemeClr>
-              </a:solidFill>
-            </a:endParaRPr>
+              <a:t>-Binary Numeral System</a:t>
+            </a:r>
           </a:p>
           <a:p>
             <a:pPr algn="l"/>
@@ -3187,14 +3158,6 @@
               </a:rPr>
               <a:t>-Hexadecimal Numeral System</a:t>
             </a:r>
-            <a:endParaRPr lang="en-CA" dirty="0" smtClean="0">
-              <a:solidFill>
-                <a:schemeClr val="tx1">
-                  <a:lumMod val="75000"/>
-                  <a:lumOff val="25000"/>
-                </a:schemeClr>
-              </a:solidFill>
-            </a:endParaRPr>
           </a:p>
           <a:p>
             <a:pPr algn="l"/>
@@ -3209,14 +3172,6 @@
               </a:rPr>
               <a:t>-BCD code</a:t>
             </a:r>
-            <a:endParaRPr lang="en-CA" dirty="0" smtClean="0">
-              <a:solidFill>
-                <a:schemeClr val="tx1">
-                  <a:lumMod val="75000"/>
-                  <a:lumOff val="25000"/>
-                </a:schemeClr>
-              </a:solidFill>
-            </a:endParaRPr>
           </a:p>
           <a:p>
             <a:pPr algn="l"/>
@@ -3245,14 +3200,6 @@
               </a:rPr>
               <a:t>-7 Segment Displays</a:t>
             </a:r>
-            <a:endParaRPr lang="en-CA" dirty="0" smtClean="0">
-              <a:solidFill>
-                <a:schemeClr val="tx1">
-                  <a:lumMod val="75000"/>
-                  <a:lumOff val="25000"/>
-                </a:schemeClr>
-              </a:solidFill>
-            </a:endParaRPr>
           </a:p>
           <a:p>
             <a:pPr algn="l"/>
@@ -3277,6 +3224,31 @@
                 </a:solidFill>
               </a:rPr>
               <a:t>Drivers</a:t>
+            </a:r>
+          </a:p>
+          <a:p>
+            <a:pPr algn="l"/>
+            <a:r>
+              <a:rPr lang="en-CA" dirty="0" smtClean="0">
+                <a:solidFill>
+                  <a:schemeClr val="tx1">
+                    <a:lumMod val="75000"/>
+                    <a:lumOff val="25000"/>
+                  </a:schemeClr>
+                </a:solidFill>
+              </a:rPr>
+              <a:t>-Lab: Typical 7 </a:t>
+            </a:r>
+            <a:r>
+              <a:rPr lang="en-CA" smtClean="0">
+                <a:solidFill>
+                  <a:schemeClr val="tx1">
+                    <a:lumMod val="75000"/>
+                    <a:lumOff val="25000"/>
+                  </a:schemeClr>
+                </a:solidFill>
+              </a:rPr>
+              <a:t>Segment Circuit</a:t>
             </a:r>
             <a:endParaRPr lang="en-CA" dirty="0" smtClean="0">
               <a:solidFill>
@@ -3337,6 +3309,152 @@
           <a:prstGeom prst="rect">
             <a:avLst/>
           </a:prstGeom>
+        </p:spPr>
+      </p:pic>
+    </p:spTree>
+  </p:cSld>
+  <p:clrMapOvr>
+    <a:masterClrMapping/>
+  </p:clrMapOvr>
+</p:sld>
+</file>
+
+<file path=ppt/slides/slide10.xml><?xml version="1.0" encoding="utf-8"?>
+<p:sld xmlns:a="http://schemas.openxmlformats.org/drawingml/2006/main" xmlns:r="http://schemas.openxmlformats.org/officeDocument/2006/relationships" xmlns:p="http://schemas.openxmlformats.org/presentationml/2006/main">
+  <p:cSld>
+    <p:spTree>
+      <p:nvGrpSpPr>
+        <p:cNvPr id="1" name=""/>
+        <p:cNvGrpSpPr/>
+        <p:nvPr/>
+      </p:nvGrpSpPr>
+      <p:grpSpPr>
+        <a:xfrm>
+          <a:off x="0" y="0"/>
+          <a:ext cx="0" cy="0"/>
+          <a:chOff x="0" y="0"/>
+          <a:chExt cx="0" cy="0"/>
+        </a:xfrm>
+      </p:grpSpPr>
+      <p:sp>
+        <p:nvSpPr>
+          <p:cNvPr id="2" name="Title 1"/>
+          <p:cNvSpPr>
+            <a:spLocks noGrp="1"/>
+          </p:cNvSpPr>
+          <p:nvPr>
+            <p:ph type="title"/>
+          </p:nvPr>
+        </p:nvSpPr>
+        <p:spPr>
+          <a:xfrm>
+            <a:off x="0" y="-27384"/>
+            <a:ext cx="9144000" cy="1143000"/>
+          </a:xfrm>
+        </p:spPr>
+        <p:txBody>
+          <a:bodyPr>
+            <a:normAutofit/>
+          </a:bodyPr>
+          <a:lstStyle/>
+          <a:p>
+            <a:pPr algn="l"/>
+            <a:r>
+              <a:rPr lang="en-CA" dirty="0" smtClean="0"/>
+              <a:t>8</a:t>
+            </a:r>
+            <a:r>
+              <a:rPr lang="en-CA" dirty="0" smtClean="0"/>
+              <a:t>	</a:t>
+            </a:r>
+            <a:r>
+              <a:rPr lang="en-CA" dirty="0" smtClean="0"/>
+              <a:t>Lab: Typical 7 Segment Circuit</a:t>
+            </a:r>
+            <a:endParaRPr lang="en-CA" u="sng" dirty="0"/>
+          </a:p>
+        </p:txBody>
+      </p:sp>
+      <p:pic>
+        <p:nvPicPr>
+          <p:cNvPr id="5" name="Picture 4" descr="by.png">
+            <a:hlinkClick r:id="rId2"/>
+          </p:cNvPr>
+          <p:cNvPicPr>
+            <a:picLocks noChangeAspect="1"/>
+          </p:cNvPicPr>
+          <p:nvPr/>
+        </p:nvPicPr>
+        <p:blipFill>
+          <a:blip r:embed="rId3" cstate="print"/>
+          <a:stretch>
+            <a:fillRect/>
+          </a:stretch>
+        </p:blipFill>
+        <p:spPr>
+          <a:xfrm>
+            <a:off x="0" y="6428558"/>
+            <a:ext cx="1227411" cy="429442"/>
+          </a:xfrm>
+          <a:prstGeom prst="rect">
+            <a:avLst/>
+          </a:prstGeom>
+        </p:spPr>
+      </p:pic>
+      <p:pic>
+        <p:nvPicPr>
+          <p:cNvPr id="9" name="Picture 8" descr="HCLLogo_194x87.png"/>
+          <p:cNvPicPr>
+            <a:picLocks noChangeAspect="1"/>
+          </p:cNvPicPr>
+          <p:nvPr/>
+        </p:nvPicPr>
+        <p:blipFill>
+          <a:blip r:embed="rId4" cstate="print"/>
+          <a:stretch>
+            <a:fillRect/>
+          </a:stretch>
+        </p:blipFill>
+        <p:spPr>
+          <a:xfrm>
+            <a:off x="7236296" y="6029325"/>
+            <a:ext cx="1847850" cy="828675"/>
+          </a:xfrm>
+          <a:prstGeom prst="rect">
+            <a:avLst/>
+          </a:prstGeom>
+        </p:spPr>
+      </p:pic>
+      <p:pic>
+        <p:nvPicPr>
+          <p:cNvPr id="1026" name="Picture 2"/>
+          <p:cNvPicPr>
+            <a:picLocks noChangeAspect="1" noChangeArrowheads="1"/>
+          </p:cNvPicPr>
+          <p:nvPr/>
+        </p:nvPicPr>
+        <p:blipFill>
+          <a:blip r:embed="rId5" cstate="print"/>
+          <a:srcRect/>
+          <a:stretch>
+            <a:fillRect/>
+          </a:stretch>
+        </p:blipFill>
+        <p:spPr bwMode="auto">
+          <a:xfrm>
+            <a:off x="251520" y="1988840"/>
+            <a:ext cx="8282612" cy="2880320"/>
+          </a:xfrm>
+          <a:prstGeom prst="rect">
+            <a:avLst/>
+          </a:prstGeom>
+          <a:noFill/>
+          <a:ln w="9525">
+            <a:noFill/>
+            <a:miter lim="800000"/>
+            <a:headEnd/>
+            <a:tailEnd/>
+          </a:ln>
         </p:spPr>
       </p:pic>
     </p:spTree>
@@ -3431,22 +3549,14 @@
             <a:pPr algn="just"/>
             <a:r>
               <a:rPr lang="en-CA" sz="1600" dirty="0" smtClean="0"/>
-              <a:t>The binary numeral system, or base-2 number system, represents numeric values using two symbols: 0 and 1. More specifically, the usual base-2 system is a positional notation with a radix of 2. Because of its straightforward implementation in digital electronic circuitry using logic gates, the binary system is used internally by almost all modern computers and computer-based devices such as mobile </a:t>
-            </a:r>
+              <a:t>The binary numeral system, or base-2 number system, represents numeric values using two symbols: 0 and 1. More specifically, the usual base-2 system is a positional notation with a radix of 2. Because of its straightforward implementation in digital electronic circuitry using logic gates, the binary system is used internally by almost all modern computers and computer-based devices such as mobile phones.</a:t>
+            </a:r>
+          </a:p>
+          <a:p>
+            <a:pPr algn="just"/>
             <a:r>
               <a:rPr lang="en-CA" sz="1600" dirty="0" smtClean="0"/>
-              <a:t>phones.</a:t>
-            </a:r>
-          </a:p>
-          <a:p>
-            <a:pPr algn="just"/>
-            <a:r>
-              <a:rPr lang="en-CA" sz="1600" dirty="0" smtClean="0"/>
-              <a:t>Any number can be represented by any sequence of bits (binary digits</a:t>
-            </a:r>
-            <a:r>
-              <a:rPr lang="en-CA" sz="1600" dirty="0" smtClean="0"/>
-              <a:t>)</a:t>
+              <a:t>Any number can be represented by any sequence of bits (binary digits)</a:t>
             </a:r>
           </a:p>
           <a:p>
@@ -3476,11 +3586,7 @@
             </a:r>
             <a:r>
               <a:rPr lang="en-CA" sz="1600" dirty="0" smtClean="0"/>
-              <a:t>, and so on. To determine the decimal representation of a binary number simply take the sum of the products of the binary digits and the powers of 2 which they represent. For example, the binary </a:t>
-            </a:r>
-            <a:r>
-              <a:rPr lang="en-CA" sz="1600" dirty="0" smtClean="0"/>
-              <a:t>number:</a:t>
+              <a:t>, and so on. To determine the decimal representation of a binary number simply take the sum of the products of the binary digits and the powers of 2 which they represent. For example, the binary number:</a:t>
             </a:r>
             <a:br>
               <a:rPr lang="en-CA" sz="1600" dirty="0" smtClean="0"/>
@@ -3496,7 +3602,6 @@
               <a:rPr lang="en-CA" sz="1600" dirty="0" smtClean="0"/>
               <a:t>100101</a:t>
             </a:r>
-            <a:endParaRPr lang="en-CA" sz="1600" dirty="0" smtClean="0"/>
           </a:p>
           <a:p>
             <a:pPr>
@@ -3504,11 +3609,7 @@
             </a:pPr>
             <a:r>
               <a:rPr lang="en-CA" sz="1600" dirty="0" smtClean="0"/>
-              <a:t>	is </a:t>
-            </a:r>
-            <a:r>
-              <a:rPr lang="en-CA" sz="1600" dirty="0" smtClean="0"/>
-              <a:t>converted to decimal form by:</a:t>
+              <a:t>	is converted to decimal form by:</a:t>
             </a:r>
           </a:p>
           <a:p>
@@ -3761,11 +3862,7 @@
           <a:p>
             <a:r>
               <a:rPr lang="en-CA" dirty="0" smtClean="0"/>
-              <a:t>**Excerpt taken from: </a:t>
-            </a:r>
-            <a:r>
-              <a:rPr lang="en-CA" dirty="0" smtClean="0"/>
-              <a:t>Wikipedia Article on </a:t>
+              <a:t>**Excerpt taken from: Wikipedia Article on </a:t>
             </a:r>
             <a:r>
               <a:rPr lang="en-CA" dirty="0" smtClean="0">
@@ -3830,11 +3927,7 @@
             <a:pPr algn="l"/>
             <a:r>
               <a:rPr lang="en-CA" dirty="0" smtClean="0"/>
-              <a:t>1.1</a:t>
-            </a:r>
-            <a:r>
-              <a:rPr lang="en-CA" dirty="0" smtClean="0"/>
-              <a:t>	 </a:t>
+              <a:t>1.1	 </a:t>
             </a:r>
             <a:r>
               <a:rPr lang="en-CA" dirty="0" smtClean="0">
@@ -3956,23 +4049,13 @@
           <a:p>
             <a:r>
               <a:rPr lang="en-CA" dirty="0" smtClean="0"/>
-              <a:t>**Table </a:t>
-            </a:r>
-            <a:r>
-              <a:rPr lang="en-CA" dirty="0" smtClean="0"/>
-              <a:t>taken from: Wikipedia Article on </a:t>
+              <a:t>**Table taken from: Wikipedia Article on </a:t>
             </a:r>
             <a:r>
               <a:rPr lang="en-CA" dirty="0" smtClean="0">
                 <a:hlinkClick r:id="rId5"/>
               </a:rPr>
-              <a:t>Binary Numeral </a:t>
-            </a:r>
-            <a:r>
-              <a:rPr lang="en-CA" dirty="0" smtClean="0">
-                <a:hlinkClick r:id="rId5"/>
-              </a:rPr>
-              <a:t>System</a:t>
+              <a:t>Binary Numeral System</a:t>
             </a:r>
             <a:endParaRPr lang="en-CA" dirty="0" smtClean="0"/>
           </a:p>
@@ -4063,11 +4146,7 @@
             <a:pPr algn="l"/>
             <a:r>
               <a:rPr lang="en-CA" dirty="0" smtClean="0"/>
-              <a:t>2</a:t>
-            </a:r>
-            <a:r>
-              <a:rPr lang="en-CA" dirty="0" smtClean="0"/>
-              <a:t>	 </a:t>
+              <a:t>2	 </a:t>
             </a:r>
             <a:r>
               <a:rPr lang="en-CA" dirty="0" smtClean="0">
@@ -4221,11 +4300,7 @@
             </a:r>
             <a:r>
               <a:rPr lang="en-CA" sz="1600" dirty="0" smtClean="0"/>
-              <a:t>), or </a:t>
-            </a:r>
-            <a:r>
-              <a:rPr lang="en-CA" sz="1600" dirty="0" smtClean="0"/>
-              <a:t>10995</a:t>
+              <a:t>), or 10995</a:t>
             </a:r>
           </a:p>
           <a:p>
@@ -4240,24 +4315,15 @@
             </a:r>
             <a:r>
               <a:rPr lang="en-CA" sz="1600" dirty="0" smtClean="0"/>
-              <a:t>, which is half of an octet (8 bits</a:t>
-            </a:r>
+              <a:t>, which is half of an octet (8 bits).</a:t>
+            </a:r>
+          </a:p>
+          <a:p>
+            <a:pPr algn="just"/>
             <a:r>
               <a:rPr lang="en-CA" sz="1600" dirty="0" smtClean="0"/>
-              <a:t>).</a:t>
-            </a:r>
-          </a:p>
-          <a:p>
-            <a:pPr algn="just"/>
-            <a:r>
-              <a:rPr lang="en-CA" sz="1600" dirty="0" smtClean="0"/>
-              <a:t>Byte </a:t>
-            </a:r>
-            <a:r>
-              <a:rPr lang="en-CA" sz="1600" dirty="0" smtClean="0"/>
-              <a:t>values can range from 0 to 255 (decimal), but may be more conveniently represented as two hexadecimal digits in the range 00 to FF. Hexadecimal is also commonly used to represent computer memory addresses.</a:t>
-            </a:r>
-            <a:endParaRPr lang="en-CA" sz="1600" dirty="0" smtClean="0"/>
+              <a:t>Byte values can range from 0 to 255 (decimal), but may be more conveniently represented as two hexadecimal digits in the range 00 to FF. Hexadecimal is also commonly used to represent computer memory addresses.</a:t>
+            </a:r>
           </a:p>
         </p:txBody>
       </p:sp>
@@ -4335,11 +4401,7 @@
           <a:p>
             <a:r>
               <a:rPr lang="en-CA" dirty="0" smtClean="0"/>
-              <a:t>**Excerpt taken from: </a:t>
-            </a:r>
-            <a:r>
-              <a:rPr lang="en-CA" dirty="0" smtClean="0"/>
-              <a:t>Wikipedia Article on </a:t>
+              <a:t>**Excerpt taken from: Wikipedia Article on </a:t>
             </a:r>
             <a:r>
               <a:rPr lang="en-CA" dirty="0" smtClean="0">
@@ -4404,11 +4466,7 @@
             <a:pPr algn="l"/>
             <a:r>
               <a:rPr lang="en-CA" dirty="0" smtClean="0"/>
-              <a:t>3</a:t>
-            </a:r>
-            <a:r>
-              <a:rPr lang="en-CA" dirty="0" smtClean="0"/>
-              <a:t>	 </a:t>
+              <a:t>3	 </a:t>
             </a:r>
             <a:r>
               <a:rPr lang="en-CA" dirty="0" smtClean="0">
@@ -4450,11 +4508,7 @@
             <a:pPr algn="just"/>
             <a:r>
               <a:rPr lang="en-CA" sz="1600" dirty="0" smtClean="0"/>
-              <a:t>In computing and electronic systems, binary-coded decimal (BCD) is a class of binary encodings of decimal numbers where each decimal digit is represented by a fixed number of bits, usually </a:t>
-            </a:r>
-            <a:r>
-              <a:rPr lang="en-CA" sz="1600" dirty="0" smtClean="0"/>
-              <a:t>four.</a:t>
+              <a:t>In computing and electronic systems, binary-coded decimal (BCD) is a class of binary encodings of decimal numbers where each decimal digit is represented by a fixed number of bits, usually four.</a:t>
             </a:r>
           </a:p>
           <a:p>
@@ -4463,7 +4517,6 @@
               <a:rPr lang="en-CA" sz="1600" dirty="0" smtClean="0"/>
               <a:t>BCD's main virtue is a more accurate representation and rounding of decimal quantities as well as an ease of conversion into human-readable representations.</a:t>
             </a:r>
-            <a:endParaRPr lang="en-CA" sz="1600" dirty="0" smtClean="0"/>
           </a:p>
         </p:txBody>
       </p:sp>
@@ -4541,11 +4594,7 @@
           <a:p>
             <a:r>
               <a:rPr lang="en-CA" dirty="0" smtClean="0"/>
-              <a:t>**Excerpt taken from: </a:t>
-            </a:r>
-            <a:r>
-              <a:rPr lang="en-CA" dirty="0" smtClean="0"/>
-              <a:t>Wikipedia Article on </a:t>
+              <a:t>**Excerpt taken from: Wikipedia Article on </a:t>
             </a:r>
             <a:r>
               <a:rPr lang="en-CA" dirty="0" smtClean="0">
@@ -4639,11 +4688,7 @@
             <a:pPr algn="l"/>
             <a:r>
               <a:rPr lang="en-CA" dirty="0" smtClean="0"/>
-              <a:t>4</a:t>
-            </a:r>
-            <a:r>
-              <a:rPr lang="en-CA" dirty="0" smtClean="0"/>
-              <a:t>	 </a:t>
+              <a:t>4	 </a:t>
             </a:r>
             <a:r>
               <a:rPr lang="en-CA" dirty="0" smtClean="0">
@@ -4685,11 +4730,7 @@
             <a:pPr algn="just"/>
             <a:r>
               <a:rPr lang="en-CA" sz="1600" dirty="0" smtClean="0"/>
-              <a:t>A seven-segment display is a form of electronic display device for displaying decimal numerals that is an alternative to the more complex dot-matrix displays. Seven-segment displays are widely used in digital clocks, electronic meters, and other electronic devices for displaying numerical information</a:t>
-            </a:r>
-            <a:r>
-              <a:rPr lang="en-CA" sz="1600" dirty="0" smtClean="0"/>
-              <a:t>.</a:t>
+              <a:t>A seven-segment display is a form of electronic display device for displaying decimal numerals that is an alternative to the more complex dot-matrix displays. Seven-segment displays are widely used in digital clocks, electronic meters, and other electronic devices for displaying numerical information.</a:t>
             </a:r>
           </a:p>
           <a:p>
@@ -4698,7 +4739,6 @@
               <a:rPr lang="en-CA" sz="1600" dirty="0" smtClean="0"/>
               <a:t>In a simple LED package, typically all of the cathodes (negative terminals) or all of the anodes (positive terminals) of the segment LEDs are connected and brought out to a common pin; this is referred to as a "common cathode" or "common anode" device. Hence a 7 segment plus decimal point package will only require nine pins</a:t>
             </a:r>
-            <a:endParaRPr lang="en-CA" sz="1600" dirty="0" smtClean="0"/>
           </a:p>
           <a:p>
             <a:pPr algn="just"/>
@@ -4780,11 +4820,7 @@
           <a:p>
             <a:r>
               <a:rPr lang="en-CA" dirty="0" smtClean="0"/>
-              <a:t>**Excerpt taken from: </a:t>
-            </a:r>
-            <a:r>
-              <a:rPr lang="en-CA" dirty="0" smtClean="0"/>
-              <a:t>Wikipedia Article on </a:t>
+              <a:t>**Excerpt taken from: Wikipedia Article on </a:t>
             </a:r>
             <a:r>
               <a:rPr lang="en-CA" dirty="0" smtClean="0">
@@ -4924,11 +4960,7 @@
             <a:pPr algn="l"/>
             <a:r>
               <a:rPr lang="en-CA" dirty="0" smtClean="0"/>
-              <a:t>5</a:t>
-            </a:r>
-            <a:r>
-              <a:rPr lang="en-CA" dirty="0" smtClean="0"/>
-              <a:t>	BCD to 7 segment Display Decoder</a:t>
+              <a:t>5	BCD to 7 segment Display Decoder</a:t>
             </a:r>
             <a:endParaRPr lang="en-CA" u="sng" dirty="0"/>
           </a:p>
@@ -4959,39 +4991,7 @@
             <a:pPr algn="just"/>
             <a:r>
               <a:rPr lang="en-CA" sz="1600" dirty="0" smtClean="0"/>
-              <a:t>A </a:t>
-            </a:r>
-            <a:r>
-              <a:rPr lang="en-CA" sz="1600" dirty="0" smtClean="0"/>
-              <a:t>BCD to 7-segment decoder </a:t>
-            </a:r>
-            <a:r>
-              <a:rPr lang="en-CA" sz="1600" dirty="0" smtClean="0"/>
-              <a:t>driver’s function </a:t>
-            </a:r>
-            <a:r>
-              <a:rPr lang="en-CA" sz="1600" dirty="0" smtClean="0"/>
-              <a:t>is to convert the logic states at the outputs of a BCD, or binary coded </a:t>
-            </a:r>
-            <a:r>
-              <a:rPr lang="en-CA" sz="1600" dirty="0" smtClean="0"/>
-              <a:t>decimal into </a:t>
-            </a:r>
-            <a:r>
-              <a:rPr lang="en-CA" sz="1600" dirty="0" smtClean="0"/>
-              <a:t>signals which will drive a 7-segment display. The display shows the decimal </a:t>
-            </a:r>
-            <a:r>
-              <a:rPr lang="en-CA" sz="1600" dirty="0" smtClean="0"/>
-              <a:t>numbers </a:t>
-            </a:r>
-            <a:r>
-              <a:rPr lang="en-CA" sz="1600" dirty="0" smtClean="0"/>
-              <a:t>0-9 and is easily understood</a:t>
-            </a:r>
-            <a:r>
-              <a:rPr lang="en-CA" sz="1600" dirty="0" smtClean="0"/>
-              <a:t>.</a:t>
+              <a:t>A BCD to 7-segment decoder driver’s function is to convert the logic states at the outputs of a BCD, or binary coded decimal into signals which will drive a 7-segment display. The display shows the decimal numbers 0-9 and is easily understood.</a:t>
             </a:r>
           </a:p>
           <a:p>
@@ -5171,11 +5171,7 @@
             <a:pPr algn="l"/>
             <a:r>
               <a:rPr lang="en-CA" dirty="0" smtClean="0"/>
-              <a:t>6</a:t>
-            </a:r>
-            <a:r>
-              <a:rPr lang="en-CA" dirty="0" smtClean="0"/>
-              <a:t>	Typical use for a 7 </a:t>
+              <a:t>6	Typical use for a 7 </a:t>
             </a:r>
             <a:r>
               <a:rPr lang="en-CA" dirty="0" err="1" smtClean="0"/>
@@ -5315,11 +5311,7 @@
             <a:pPr algn="l"/>
             <a:r>
               <a:rPr lang="en-CA" dirty="0" smtClean="0"/>
-              <a:t>7</a:t>
-            </a:r>
-            <a:r>
-              <a:rPr lang="en-CA" dirty="0" smtClean="0"/>
-              <a:t>	Inside a BCD to 7 </a:t>
+              <a:t>7	Inside a BCD to 7 </a:t>
             </a:r>
             <a:r>
               <a:rPr lang="en-CA" dirty="0" err="1" smtClean="0"/>

</xml_diff>